<commit_message>
added grass portal to demontstration
</commit_message>
<xml_diff>
--- a/Tools/trait_data/src/accessing_trait_data.pptx
+++ b/Tools/trait_data/src/accessing_trait_data.pptx
@@ -14,10 +14,11 @@
     <p:sldId id="261" r:id="rId8"/>
     <p:sldId id="268" r:id="rId9"/>
     <p:sldId id="269" r:id="rId10"/>
-    <p:sldId id="263" r:id="rId11"/>
-    <p:sldId id="264" r:id="rId12"/>
-    <p:sldId id="265" r:id="rId13"/>
-    <p:sldId id="267" r:id="rId14"/>
+    <p:sldId id="270" r:id="rId11"/>
+    <p:sldId id="263" r:id="rId12"/>
+    <p:sldId id="264" r:id="rId13"/>
+    <p:sldId id="265" r:id="rId14"/>
+    <p:sldId id="267" r:id="rId15"/>
   </p:sldIdLst>
   <p:sldSz cx="12192000" cy="6858000"/>
   <p:notesSz cx="6858000" cy="9144000"/>
@@ -3440,6 +3441,143 @@
           <p:cNvPr id="2" name="Title 1">
             <a:extLst>
               <a:ext uri="{FF2B5EF4-FFF2-40B4-BE49-F238E27FC236}">
+                <a16:creationId xmlns:a16="http://schemas.microsoft.com/office/drawing/2014/main" id="{D3B48790-3033-194B-B0FD-15189984180D}"/>
+              </a:ext>
+            </a:extLst>
+          </p:cNvPr>
+          <p:cNvSpPr>
+            <a:spLocks noGrp="1"/>
+          </p:cNvSpPr>
+          <p:nvPr>
+            <p:ph type="title"/>
+          </p:nvPr>
+        </p:nvSpPr>
+        <p:spPr/>
+        <p:txBody>
+          <a:bodyPr/>
+          <a:lstStyle/>
+          <a:p>
+            <a:r>
+              <a:rPr lang="en-US" dirty="0"/>
+              <a:t>Grass Portal</a:t>
+            </a:r>
+          </a:p>
+        </p:txBody>
+      </p:sp>
+      <p:sp>
+        <p:nvSpPr>
+          <p:cNvPr id="3" name="Content Placeholder 2">
+            <a:extLst>
+              <a:ext uri="{FF2B5EF4-FFF2-40B4-BE49-F238E27FC236}">
+                <a16:creationId xmlns:a16="http://schemas.microsoft.com/office/drawing/2014/main" id="{1E96BCB3-BA85-6641-BC7C-EC97B74AE0D3}"/>
+              </a:ext>
+            </a:extLst>
+          </p:cNvPr>
+          <p:cNvSpPr>
+            <a:spLocks noGrp="1"/>
+          </p:cNvSpPr>
+          <p:nvPr>
+            <p:ph idx="1"/>
+          </p:nvPr>
+        </p:nvSpPr>
+        <p:spPr/>
+        <p:txBody>
+          <a:bodyPr/>
+          <a:lstStyle/>
+          <a:p>
+            <a:pPr marL="0" indent="0" algn="ctr">
+              <a:buNone/>
+            </a:pPr>
+            <a:r>
+              <a:rPr lang="en-US" dirty="0">
+                <a:hlinkClick r:id="rId2"/>
+              </a:rPr>
+              <a:t>http://www.grassportal.org/index.html</a:t>
+            </a:r>
+            <a:endParaRPr lang="en-US" dirty="0"/>
+          </a:p>
+          <a:p>
+            <a:pPr marL="0" indent="0" algn="ctr">
+              <a:buNone/>
+            </a:pPr>
+            <a:endParaRPr lang="en-US" dirty="0"/>
+          </a:p>
+          <a:p>
+            <a:pPr marL="0" indent="0" algn="ctr">
+              <a:buNone/>
+            </a:pPr>
+            <a:r>
+              <a:rPr lang="en-US" dirty="0"/>
+              <a:t>Grass traits, names, locations!</a:t>
+            </a:r>
+          </a:p>
+        </p:txBody>
+      </p:sp>
+      <p:pic>
+        <p:nvPicPr>
+          <p:cNvPr id="5" name="Picture 4">
+            <a:extLst>
+              <a:ext uri="{FF2B5EF4-FFF2-40B4-BE49-F238E27FC236}">
+                <a16:creationId xmlns:a16="http://schemas.microsoft.com/office/drawing/2014/main" id="{C122DD5F-A8D8-0947-AB18-EE3D13BB301B}"/>
+              </a:ext>
+            </a:extLst>
+          </p:cNvPr>
+          <p:cNvPicPr>
+            <a:picLocks noChangeAspect="1"/>
+          </p:cNvPicPr>
+          <p:nvPr/>
+        </p:nvPicPr>
+        <p:blipFill>
+          <a:blip r:embed="rId3"/>
+          <a:stretch>
+            <a:fillRect/>
+          </a:stretch>
+        </p:blipFill>
+        <p:spPr>
+          <a:xfrm>
+            <a:off x="4203700" y="4101272"/>
+            <a:ext cx="3784600" cy="1968500"/>
+          </a:xfrm>
+          <a:prstGeom prst="rect">
+            <a:avLst/>
+          </a:prstGeom>
+        </p:spPr>
+      </p:pic>
+    </p:spTree>
+    <p:extLst>
+      <p:ext uri="{BB962C8B-B14F-4D97-AF65-F5344CB8AC3E}">
+        <p14:creationId xmlns:p14="http://schemas.microsoft.com/office/powerpoint/2010/main" val="577589192"/>
+      </p:ext>
+    </p:extLst>
+  </p:cSld>
+  <p:clrMapOvr>
+    <a:masterClrMapping/>
+  </p:clrMapOvr>
+</p:sld>
+</file>
+
+<file path=ppt/slides/slide11.xml><?xml version="1.0" encoding="utf-8"?>
+<p:sld xmlns:a="http://schemas.openxmlformats.org/drawingml/2006/main" xmlns:r="http://schemas.openxmlformats.org/officeDocument/2006/relationships" xmlns:p="http://schemas.openxmlformats.org/presentationml/2006/main">
+  <p:cSld>
+    <p:spTree>
+      <p:nvGrpSpPr>
+        <p:cNvPr id="1" name=""/>
+        <p:cNvGrpSpPr/>
+        <p:nvPr/>
+      </p:nvGrpSpPr>
+      <p:grpSpPr>
+        <a:xfrm>
+          <a:off x="0" y="0"/>
+          <a:ext cx="0" cy="0"/>
+          <a:chOff x="0" y="0"/>
+          <a:chExt cx="0" cy="0"/>
+        </a:xfrm>
+      </p:grpSpPr>
+      <p:sp>
+        <p:nvSpPr>
+          <p:cNvPr id="2" name="Title 1">
+            <a:extLst>
+              <a:ext uri="{FF2B5EF4-FFF2-40B4-BE49-F238E27FC236}">
                 <a16:creationId xmlns:a16="http://schemas.microsoft.com/office/drawing/2014/main" id="{039EFFD6-575B-0745-8363-2C86CD97E393}"/>
               </a:ext>
             </a:extLst>
@@ -3501,7 +3639,7 @@
 </p:sld>
 </file>
 
-<file path=ppt/slides/slide11.xml><?xml version="1.0" encoding="utf-8"?>
+<file path=ppt/slides/slide12.xml><?xml version="1.0" encoding="utf-8"?>
 <p:sld xmlns:a="http://schemas.openxmlformats.org/drawingml/2006/main" xmlns:r="http://schemas.openxmlformats.org/officeDocument/2006/relationships" xmlns:p="http://schemas.openxmlformats.org/presentationml/2006/main">
   <p:cSld>
     <p:spTree>
@@ -3647,7 +3785,7 @@
 </p:sld>
 </file>
 
-<file path=ppt/slides/slide12.xml><?xml version="1.0" encoding="utf-8"?>
+<file path=ppt/slides/slide13.xml><?xml version="1.0" encoding="utf-8"?>
 <p:sld xmlns:a="http://schemas.openxmlformats.org/drawingml/2006/main" xmlns:r="http://schemas.openxmlformats.org/officeDocument/2006/relationships" xmlns:p="http://schemas.openxmlformats.org/presentationml/2006/main">
   <p:cSld>
     <p:spTree>
@@ -3802,7 +3940,7 @@
 </p:sld>
 </file>
 
-<file path=ppt/slides/slide13.xml><?xml version="1.0" encoding="utf-8"?>
+<file path=ppt/slides/slide14.xml><?xml version="1.0" encoding="utf-8"?>
 <p:sld xmlns:a="http://schemas.openxmlformats.org/drawingml/2006/main" xmlns:r="http://schemas.openxmlformats.org/officeDocument/2006/relationships" xmlns:p="http://schemas.openxmlformats.org/presentationml/2006/main">
   <p:cSld>
     <p:spTree>

</xml_diff>

<commit_message>
included LCE to trait database
</commit_message>
<xml_diff>
--- a/Tools/trait_data/src/accessing_trait_data.pptx
+++ b/Tools/trait_data/src/accessing_trait_data.pptx
@@ -19,6 +19,7 @@
     <p:sldId id="264" r:id="rId13"/>
     <p:sldId id="265" r:id="rId14"/>
     <p:sldId id="267" r:id="rId15"/>
+    <p:sldId id="271" r:id="rId16"/>
   </p:sldIdLst>
   <p:sldSz cx="12192000" cy="6858000"/>
   <p:notesSz cx="6858000" cy="9144000"/>
@@ -272,7 +273,7 @@
           <a:p>
             <a:fld id="{14E99FE3-D1D1-E84B-B72A-70EA1CE80B2E}" type="datetimeFigureOut">
               <a:rPr lang="en-US" smtClean="0"/>
-              <a:t>1/24/19</a:t>
+              <a:t>1/30/19</a:t>
             </a:fld>
             <a:endParaRPr lang="en-US"/>
           </a:p>
@@ -470,7 +471,7 @@
           <a:p>
             <a:fld id="{14E99FE3-D1D1-E84B-B72A-70EA1CE80B2E}" type="datetimeFigureOut">
               <a:rPr lang="en-US" smtClean="0"/>
-              <a:t>1/24/19</a:t>
+              <a:t>1/30/19</a:t>
             </a:fld>
             <a:endParaRPr lang="en-US"/>
           </a:p>
@@ -678,7 +679,7 @@
           <a:p>
             <a:fld id="{14E99FE3-D1D1-E84B-B72A-70EA1CE80B2E}" type="datetimeFigureOut">
               <a:rPr lang="en-US" smtClean="0"/>
-              <a:t>1/24/19</a:t>
+              <a:t>1/30/19</a:t>
             </a:fld>
             <a:endParaRPr lang="en-US"/>
           </a:p>
@@ -876,7 +877,7 @@
           <a:p>
             <a:fld id="{14E99FE3-D1D1-E84B-B72A-70EA1CE80B2E}" type="datetimeFigureOut">
               <a:rPr lang="en-US" smtClean="0"/>
-              <a:t>1/24/19</a:t>
+              <a:t>1/30/19</a:t>
             </a:fld>
             <a:endParaRPr lang="en-US"/>
           </a:p>
@@ -1151,7 +1152,7 @@
           <a:p>
             <a:fld id="{14E99FE3-D1D1-E84B-B72A-70EA1CE80B2E}" type="datetimeFigureOut">
               <a:rPr lang="en-US" smtClean="0"/>
-              <a:t>1/24/19</a:t>
+              <a:t>1/30/19</a:t>
             </a:fld>
             <a:endParaRPr lang="en-US"/>
           </a:p>
@@ -1416,7 +1417,7 @@
           <a:p>
             <a:fld id="{14E99FE3-D1D1-E84B-B72A-70EA1CE80B2E}" type="datetimeFigureOut">
               <a:rPr lang="en-US" smtClean="0"/>
-              <a:t>1/24/19</a:t>
+              <a:t>1/30/19</a:t>
             </a:fld>
             <a:endParaRPr lang="en-US"/>
           </a:p>
@@ -1828,7 +1829,7 @@
           <a:p>
             <a:fld id="{14E99FE3-D1D1-E84B-B72A-70EA1CE80B2E}" type="datetimeFigureOut">
               <a:rPr lang="en-US" smtClean="0"/>
-              <a:t>1/24/19</a:t>
+              <a:t>1/30/19</a:t>
             </a:fld>
             <a:endParaRPr lang="en-US"/>
           </a:p>
@@ -1969,7 +1970,7 @@
           <a:p>
             <a:fld id="{14E99FE3-D1D1-E84B-B72A-70EA1CE80B2E}" type="datetimeFigureOut">
               <a:rPr lang="en-US" smtClean="0"/>
-              <a:t>1/24/19</a:t>
+              <a:t>1/30/19</a:t>
             </a:fld>
             <a:endParaRPr lang="en-US"/>
           </a:p>
@@ -2082,7 +2083,7 @@
           <a:p>
             <a:fld id="{14E99FE3-D1D1-E84B-B72A-70EA1CE80B2E}" type="datetimeFigureOut">
               <a:rPr lang="en-US" smtClean="0"/>
-              <a:t>1/24/19</a:t>
+              <a:t>1/30/19</a:t>
             </a:fld>
             <a:endParaRPr lang="en-US"/>
           </a:p>
@@ -2393,7 +2394,7 @@
           <a:p>
             <a:fld id="{14E99FE3-D1D1-E84B-B72A-70EA1CE80B2E}" type="datetimeFigureOut">
               <a:rPr lang="en-US" smtClean="0"/>
-              <a:t>1/24/19</a:t>
+              <a:t>1/30/19</a:t>
             </a:fld>
             <a:endParaRPr lang="en-US"/>
           </a:p>
@@ -2681,7 +2682,7 @@
           <a:p>
             <a:fld id="{14E99FE3-D1D1-E84B-B72A-70EA1CE80B2E}" type="datetimeFigureOut">
               <a:rPr lang="en-US" smtClean="0"/>
-              <a:t>1/24/19</a:t>
+              <a:t>1/30/19</a:t>
             </a:fld>
             <a:endParaRPr lang="en-US"/>
           </a:p>
@@ -2922,7 +2923,7 @@
           <a:p>
             <a:fld id="{14E99FE3-D1D1-E84B-B72A-70EA1CE80B2E}" type="datetimeFigureOut">
               <a:rPr lang="en-US" smtClean="0"/>
-              <a:t>1/24/19</a:t>
+              <a:t>1/30/19</a:t>
             </a:fld>
             <a:endParaRPr lang="en-US"/>
           </a:p>
@@ -4095,6 +4096,170 @@
 </p:sld>
 </file>
 
+<file path=ppt/slides/slide15.xml><?xml version="1.0" encoding="utf-8"?>
+<p:sld xmlns:a="http://schemas.openxmlformats.org/drawingml/2006/main" xmlns:r="http://schemas.openxmlformats.org/officeDocument/2006/relationships" xmlns:p="http://schemas.openxmlformats.org/presentationml/2006/main">
+  <p:cSld>
+    <p:spTree>
+      <p:nvGrpSpPr>
+        <p:cNvPr id="1" name=""/>
+        <p:cNvGrpSpPr/>
+        <p:nvPr/>
+      </p:nvGrpSpPr>
+      <p:grpSpPr>
+        <a:xfrm>
+          <a:off x="0" y="0"/>
+          <a:ext cx="0" cy="0"/>
+          <a:chOff x="0" y="0"/>
+          <a:chExt cx="0" cy="0"/>
+        </a:xfrm>
+      </p:grpSpPr>
+      <p:sp>
+        <p:nvSpPr>
+          <p:cNvPr id="2" name="Title 1">
+            <a:extLst>
+              <a:ext uri="{FF2B5EF4-FFF2-40B4-BE49-F238E27FC236}">
+                <a16:creationId xmlns:a16="http://schemas.microsoft.com/office/drawing/2014/main" id="{D3B48790-3033-194B-B0FD-15189984180D}"/>
+              </a:ext>
+            </a:extLst>
+          </p:cNvPr>
+          <p:cNvSpPr>
+            <a:spLocks noGrp="1"/>
+          </p:cNvSpPr>
+          <p:nvPr>
+            <p:ph type="title"/>
+          </p:nvPr>
+        </p:nvSpPr>
+        <p:spPr/>
+        <p:txBody>
+          <a:bodyPr/>
+          <a:lstStyle/>
+          <a:p>
+            <a:r>
+              <a:rPr lang="en-US" dirty="0"/>
+              <a:t>Leaf Carbon Exchange (LCE) Database</a:t>
+            </a:r>
+          </a:p>
+        </p:txBody>
+      </p:sp>
+      <p:sp>
+        <p:nvSpPr>
+          <p:cNvPr id="3" name="Content Placeholder 2">
+            <a:extLst>
+              <a:ext uri="{FF2B5EF4-FFF2-40B4-BE49-F238E27FC236}">
+                <a16:creationId xmlns:a16="http://schemas.microsoft.com/office/drawing/2014/main" id="{1E96BCB3-BA85-6641-BC7C-EC97B74AE0D3}"/>
+              </a:ext>
+            </a:extLst>
+          </p:cNvPr>
+          <p:cNvSpPr>
+            <a:spLocks noGrp="1"/>
+          </p:cNvSpPr>
+          <p:nvPr>
+            <p:ph idx="1"/>
+          </p:nvPr>
+        </p:nvSpPr>
+        <p:spPr/>
+        <p:txBody>
+          <a:bodyPr/>
+          <a:lstStyle/>
+          <a:p>
+            <a:pPr marL="0" indent="0" algn="ctr">
+              <a:buNone/>
+            </a:pPr>
+            <a:r>
+              <a:rPr lang="en-US" dirty="0">
+                <a:hlinkClick r:id="rId2"/>
+              </a:rPr>
+              <a:t>https://esajournals.onlinelibrary.wiley.com/doi/full/10.1002/ecy.1992</a:t>
+            </a:r>
+            <a:endParaRPr lang="en-US" dirty="0"/>
+          </a:p>
+          <a:p>
+            <a:pPr marL="0" indent="0" algn="ctr">
+              <a:buNone/>
+            </a:pPr>
+            <a:endParaRPr lang="en-US" dirty="0"/>
+          </a:p>
+          <a:p>
+            <a:pPr marL="0" indent="0" algn="ctr">
+              <a:buNone/>
+            </a:pPr>
+            <a:r>
+              <a:rPr lang="en-US" dirty="0"/>
+              <a:t>98 species</a:t>
+            </a:r>
+          </a:p>
+          <a:p>
+            <a:pPr marL="0" indent="0" algn="ctr">
+              <a:buNone/>
+            </a:pPr>
+            <a:r>
+              <a:rPr lang="en-US" dirty="0"/>
+              <a:t>Leaf traits (SLA, nutrients, and gas exchange)</a:t>
+            </a:r>
+          </a:p>
+          <a:p>
+            <a:pPr marL="0" indent="0" algn="ctr">
+              <a:buNone/>
+            </a:pPr>
+            <a:r>
+              <a:rPr lang="en-US" dirty="0"/>
+              <a:t>Basic plant size information</a:t>
+            </a:r>
+          </a:p>
+          <a:p>
+            <a:pPr marL="0" indent="0" algn="ctr">
+              <a:buNone/>
+            </a:pPr>
+            <a:r>
+              <a:rPr lang="en-US" dirty="0"/>
+              <a:t>Boreal - tropical</a:t>
+            </a:r>
+          </a:p>
+        </p:txBody>
+      </p:sp>
+      <p:pic>
+        <p:nvPicPr>
+          <p:cNvPr id="5" name="Picture 4">
+            <a:extLst>
+              <a:ext uri="{FF2B5EF4-FFF2-40B4-BE49-F238E27FC236}">
+                <a16:creationId xmlns:a16="http://schemas.microsoft.com/office/drawing/2014/main" id="{26E8693F-0B81-AE48-AD95-40C68BAF9AA3}"/>
+              </a:ext>
+            </a:extLst>
+          </p:cNvPr>
+          <p:cNvPicPr>
+            <a:picLocks noChangeAspect="1"/>
+          </p:cNvPicPr>
+          <p:nvPr/>
+        </p:nvPicPr>
+        <p:blipFill>
+          <a:blip r:embed="rId3"/>
+          <a:stretch>
+            <a:fillRect/>
+          </a:stretch>
+        </p:blipFill>
+        <p:spPr>
+          <a:xfrm>
+            <a:off x="4258101" y="4977837"/>
+            <a:ext cx="4100489" cy="1771075"/>
+          </a:xfrm>
+          <a:prstGeom prst="rect">
+            <a:avLst/>
+          </a:prstGeom>
+        </p:spPr>
+      </p:pic>
+    </p:spTree>
+    <p:extLst>
+      <p:ext uri="{BB962C8B-B14F-4D97-AF65-F5344CB8AC3E}">
+        <p14:creationId xmlns:p14="http://schemas.microsoft.com/office/powerpoint/2010/main" val="1378521404"/>
+      </p:ext>
+    </p:extLst>
+  </p:cSld>
+  <p:clrMapOvr>
+    <a:masterClrMapping/>
+  </p:clrMapOvr>
+</p:sld>
+</file>
+
 <file path=ppt/slides/slide2.xml><?xml version="1.0" encoding="utf-8"?>
 <p:sld xmlns:a="http://schemas.openxmlformats.org/drawingml/2006/main" xmlns:r="http://schemas.openxmlformats.org/officeDocument/2006/relationships" xmlns:p="http://schemas.openxmlformats.org/presentationml/2006/main">
   <p:cSld>

</xml_diff>